<commit_message>
Minor change to text position
</commit_message>
<xml_diff>
--- a/design/statechart/agse_design_statechart.pptx
+++ b/design/statechart/agse_design_statechart.pptx
@@ -192,7 +192,7 @@
           <a:p>
             <a:fld id="{65F28216-4810-4052-8F3A-34285B87EA79}" type="datetimeFigureOut">
               <a:rPr lang="en-US" smtClean="0"/>
-              <a:t>2014-11-02</a:t>
+              <a:t>11/2/2014</a:t>
             </a:fld>
             <a:endParaRPr lang="en-US"/>
           </a:p>
@@ -725,7 +725,7 @@
           <a:p>
             <a:fld id="{A0F6182D-4BB0-4176-9A51-07A5F05FFC3D}" type="datetimeFigureOut">
               <a:rPr lang="en-US" smtClean="0"/>
-              <a:t>2014-11-02</a:t>
+              <a:t>11/2/2014</a:t>
             </a:fld>
             <a:endParaRPr lang="en-US"/>
           </a:p>
@@ -895,7 +895,7 @@
           <a:p>
             <a:fld id="{A0F6182D-4BB0-4176-9A51-07A5F05FFC3D}" type="datetimeFigureOut">
               <a:rPr lang="en-US" smtClean="0"/>
-              <a:t>2014-11-02</a:t>
+              <a:t>11/2/2014</a:t>
             </a:fld>
             <a:endParaRPr lang="en-US"/>
           </a:p>
@@ -1075,7 +1075,7 @@
           <a:p>
             <a:fld id="{A0F6182D-4BB0-4176-9A51-07A5F05FFC3D}" type="datetimeFigureOut">
               <a:rPr lang="en-US" smtClean="0"/>
-              <a:t>2014-11-02</a:t>
+              <a:t>11/2/2014</a:t>
             </a:fld>
             <a:endParaRPr lang="en-US"/>
           </a:p>
@@ -1245,7 +1245,7 @@
           <a:p>
             <a:fld id="{A0F6182D-4BB0-4176-9A51-07A5F05FFC3D}" type="datetimeFigureOut">
               <a:rPr lang="en-US" smtClean="0"/>
-              <a:t>2014-11-02</a:t>
+              <a:t>11/2/2014</a:t>
             </a:fld>
             <a:endParaRPr lang="en-US"/>
           </a:p>
@@ -1491,7 +1491,7 @@
           <a:p>
             <a:fld id="{A0F6182D-4BB0-4176-9A51-07A5F05FFC3D}" type="datetimeFigureOut">
               <a:rPr lang="en-US" smtClean="0"/>
-              <a:t>2014-11-02</a:t>
+              <a:t>11/2/2014</a:t>
             </a:fld>
             <a:endParaRPr lang="en-US"/>
           </a:p>
@@ -1779,7 +1779,7 @@
           <a:p>
             <a:fld id="{A0F6182D-4BB0-4176-9A51-07A5F05FFC3D}" type="datetimeFigureOut">
               <a:rPr lang="en-US" smtClean="0"/>
-              <a:t>2014-11-02</a:t>
+              <a:t>11/2/2014</a:t>
             </a:fld>
             <a:endParaRPr lang="en-US"/>
           </a:p>
@@ -2206,7 +2206,7 @@
           <a:p>
             <a:fld id="{A0F6182D-4BB0-4176-9A51-07A5F05FFC3D}" type="datetimeFigureOut">
               <a:rPr lang="en-US" smtClean="0"/>
-              <a:t>2014-11-02</a:t>
+              <a:t>11/2/2014</a:t>
             </a:fld>
             <a:endParaRPr lang="en-US"/>
           </a:p>
@@ -2324,7 +2324,7 @@
           <a:p>
             <a:fld id="{A0F6182D-4BB0-4176-9A51-07A5F05FFC3D}" type="datetimeFigureOut">
               <a:rPr lang="en-US" smtClean="0"/>
-              <a:t>2014-11-02</a:t>
+              <a:t>11/2/2014</a:t>
             </a:fld>
             <a:endParaRPr lang="en-US"/>
           </a:p>
@@ -2419,7 +2419,7 @@
           <a:p>
             <a:fld id="{A0F6182D-4BB0-4176-9A51-07A5F05FFC3D}" type="datetimeFigureOut">
               <a:rPr lang="en-US" smtClean="0"/>
-              <a:t>2014-11-02</a:t>
+              <a:t>11/2/2014</a:t>
             </a:fld>
             <a:endParaRPr lang="en-US"/>
           </a:p>
@@ -2696,7 +2696,7 @@
           <a:p>
             <a:fld id="{A0F6182D-4BB0-4176-9A51-07A5F05FFC3D}" type="datetimeFigureOut">
               <a:rPr lang="en-US" smtClean="0"/>
-              <a:t>2014-11-02</a:t>
+              <a:t>11/2/2014</a:t>
             </a:fld>
             <a:endParaRPr lang="en-US"/>
           </a:p>
@@ -2949,7 +2949,7 @@
           <a:p>
             <a:fld id="{A0F6182D-4BB0-4176-9A51-07A5F05FFC3D}" type="datetimeFigureOut">
               <a:rPr lang="en-US" smtClean="0"/>
-              <a:t>2014-11-02</a:t>
+              <a:t>11/2/2014</a:t>
             </a:fld>
             <a:endParaRPr lang="en-US"/>
           </a:p>
@@ -3162,7 +3162,7 @@
           <a:p>
             <a:fld id="{A0F6182D-4BB0-4176-9A51-07A5F05FFC3D}" type="datetimeFigureOut">
               <a:rPr lang="en-US" smtClean="0"/>
-              <a:t>2014-11-02</a:t>
+              <a:t>11/2/2014</a:t>
             </a:fld>
             <a:endParaRPr lang="en-US"/>
           </a:p>
@@ -4413,7 +4413,7 @@
         </p:nvSpPr>
         <p:spPr>
           <a:xfrm>
-            <a:off x="8000881" y="5574524"/>
+            <a:off x="7533033" y="5574524"/>
             <a:ext cx="2268434" cy="1559749"/>
           </a:xfrm>
           <a:prstGeom prst="rect">
@@ -4611,8 +4611,8 @@
         </p:nvCxnSpPr>
         <p:spPr>
           <a:xfrm>
-            <a:off x="10269315" y="6354399"/>
-            <a:ext cx="818402" cy="628904"/>
+            <a:off x="9801467" y="6354399"/>
+            <a:ext cx="1286250" cy="628904"/>
           </a:xfrm>
           <a:prstGeom prst="curvedConnector3">
             <a:avLst>
@@ -4937,7 +4937,7 @@
         </p:nvSpPr>
         <p:spPr>
           <a:xfrm>
-            <a:off x="7104419" y="7830464"/>
+            <a:off x="6829501" y="7218418"/>
             <a:ext cx="2346972" cy="584775"/>
           </a:xfrm>
           <a:prstGeom prst="rect">
@@ -4953,19 +4953,7 @@
           <a:p>
             <a:r>
               <a:rPr lang="en-US" sz="1600" b="1" dirty="0" smtClean="0"/>
-              <a:t>!</a:t>
-            </a:r>
-            <a:r>
-              <a:rPr lang="en-US" sz="1600" b="1" dirty="0" err="1" smtClean="0"/>
-              <a:t>Has_Sample</a:t>
-            </a:r>
-            <a:r>
-              <a:rPr lang="en-US" sz="1600" b="1" dirty="0" smtClean="0"/>
-              <a:t> &amp;&amp; </a:t>
-            </a:r>
-            <a:r>
-              <a:rPr lang="en-US" sz="1600" b="1" dirty="0" err="1" smtClean="0"/>
-              <a:t>Reached_Bay</a:t>
+              <a:t>!Has_Sample &amp;&amp; Reached_Bay</a:t>
             </a:r>
             <a:endParaRPr lang="en-US" sz="1600" b="1" dirty="0"/>
           </a:p>
@@ -5261,7 +5249,7 @@
         <p:spPr>
           <a:xfrm flipV="1">
             <a:off x="7030700" y="7134273"/>
-            <a:ext cx="2104398" cy="1729667"/>
+            <a:ext cx="1636550" cy="864833"/>
           </a:xfrm>
           <a:prstGeom prst="curvedConnector2">
             <a:avLst/>
@@ -5296,7 +5284,7 @@
         </p:nvSpPr>
         <p:spPr>
           <a:xfrm>
-            <a:off x="4612330" y="7066744"/>
+            <a:off x="2306159" y="7086426"/>
             <a:ext cx="2189770" cy="338554"/>
           </a:xfrm>
           <a:prstGeom prst="rect">
@@ -6073,8 +6061,8 @@
         </p:nvSpPr>
         <p:spPr>
           <a:xfrm>
-            <a:off x="10106847" y="5816025"/>
-            <a:ext cx="980876" cy="584775"/>
+            <a:off x="9677400" y="5940078"/>
+            <a:ext cx="1410323" cy="338554"/>
           </a:xfrm>
           <a:prstGeom prst="rect">
             <a:avLst/>
@@ -6090,18 +6078,11 @@
             <a:pPr algn="ctr"/>
             <a:r>
               <a:rPr lang="en-US" sz="1600" b="1" dirty="0" smtClean="0"/>
-              <a:t>  Opened</a:t>
-            </a:r>
-          </a:p>
-          <a:p>
-            <a:pPr algn="ctr"/>
-            <a:r>
-              <a:rPr lang="en-US" sz="1600" b="1" dirty="0"/>
-              <a:t> </a:t>
+              <a:t>  </a:t>
             </a:r>
             <a:r>
               <a:rPr lang="en-US" sz="1600" b="1" dirty="0" smtClean="0"/>
-              <a:t> _Bay</a:t>
+              <a:t>Opened_Bay</a:t>
             </a:r>
             <a:endParaRPr lang="en-US" sz="1600" b="1" dirty="0"/>
           </a:p>
@@ -6115,7 +6096,7 @@
         </p:nvSpPr>
         <p:spPr>
           <a:xfrm>
-            <a:off x="7128303" y="10118491"/>
+            <a:off x="6675489" y="10123991"/>
             <a:ext cx="2346972" cy="584775"/>
           </a:xfrm>
           <a:prstGeom prst="rect">
@@ -6129,17 +6110,10 @@
           </a:bodyPr>
           <a:lstStyle/>
           <a:p>
-            <a:r>
-              <a:rPr lang="en-US" sz="1600" b="1" dirty="0" err="1" smtClean="0"/>
-              <a:t>Has_Sample</a:t>
-            </a:r>
+            <a:pPr algn="ctr"/>
             <a:r>
               <a:rPr lang="en-US" sz="1600" b="1" dirty="0" smtClean="0"/>
-              <a:t> &amp;&amp; </a:t>
-            </a:r>
-            <a:r>
-              <a:rPr lang="en-US" sz="1600" b="1" dirty="0" err="1" smtClean="0"/>
-              <a:t>Reached_Bay</a:t>
+              <a:t>Has_Sample &amp;&amp; Reached_Bay</a:t>
             </a:r>
             <a:endParaRPr lang="en-US" sz="1600" b="1" dirty="0"/>
           </a:p>

</xml_diff>

<commit_message>
Added the Payload Bay Statechart
</commit_message>
<xml_diff>
--- a/design/statechart/agse_design_statechart.pptx
+++ b/design/statechart/agse_design_statechart.pptx
@@ -5,10 +5,11 @@
     <p:sldMasterId id="2147483648" r:id="rId1"/>
   </p:sldMasterIdLst>
   <p:notesMasterIdLst>
-    <p:notesMasterId r:id="rId3"/>
+    <p:notesMasterId r:id="rId4"/>
   </p:notesMasterIdLst>
   <p:sldIdLst>
     <p:sldId id="256" r:id="rId2"/>
+    <p:sldId id="257" r:id="rId3"/>
   </p:sldIdLst>
   <p:sldSz cx="18288000" cy="18288000"/>
   <p:notesSz cx="6858000" cy="9144000"/>
@@ -192,7 +193,7 @@
           <a:p>
             <a:fld id="{65F28216-4810-4052-8F3A-34285B87EA79}" type="datetimeFigureOut">
               <a:rPr lang="en-US" smtClean="0"/>
-              <a:t>11/2/2014</a:t>
+              <a:t>11/4/2014</a:t>
             </a:fld>
             <a:endParaRPr lang="en-US"/>
           </a:p>
@@ -725,7 +726,7 @@
           <a:p>
             <a:fld id="{A0F6182D-4BB0-4176-9A51-07A5F05FFC3D}" type="datetimeFigureOut">
               <a:rPr lang="en-US" smtClean="0"/>
-              <a:t>11/2/2014</a:t>
+              <a:t>11/4/2014</a:t>
             </a:fld>
             <a:endParaRPr lang="en-US"/>
           </a:p>
@@ -895,7 +896,7 @@
           <a:p>
             <a:fld id="{A0F6182D-4BB0-4176-9A51-07A5F05FFC3D}" type="datetimeFigureOut">
               <a:rPr lang="en-US" smtClean="0"/>
-              <a:t>11/2/2014</a:t>
+              <a:t>11/4/2014</a:t>
             </a:fld>
             <a:endParaRPr lang="en-US"/>
           </a:p>
@@ -1075,7 +1076,7 @@
           <a:p>
             <a:fld id="{A0F6182D-4BB0-4176-9A51-07A5F05FFC3D}" type="datetimeFigureOut">
               <a:rPr lang="en-US" smtClean="0"/>
-              <a:t>11/2/2014</a:t>
+              <a:t>11/4/2014</a:t>
             </a:fld>
             <a:endParaRPr lang="en-US"/>
           </a:p>
@@ -1245,7 +1246,7 @@
           <a:p>
             <a:fld id="{A0F6182D-4BB0-4176-9A51-07A5F05FFC3D}" type="datetimeFigureOut">
               <a:rPr lang="en-US" smtClean="0"/>
-              <a:t>11/2/2014</a:t>
+              <a:t>11/4/2014</a:t>
             </a:fld>
             <a:endParaRPr lang="en-US"/>
           </a:p>
@@ -1491,7 +1492,7 @@
           <a:p>
             <a:fld id="{A0F6182D-4BB0-4176-9A51-07A5F05FFC3D}" type="datetimeFigureOut">
               <a:rPr lang="en-US" smtClean="0"/>
-              <a:t>11/2/2014</a:t>
+              <a:t>11/4/2014</a:t>
             </a:fld>
             <a:endParaRPr lang="en-US"/>
           </a:p>
@@ -1779,7 +1780,7 @@
           <a:p>
             <a:fld id="{A0F6182D-4BB0-4176-9A51-07A5F05FFC3D}" type="datetimeFigureOut">
               <a:rPr lang="en-US" smtClean="0"/>
-              <a:t>11/2/2014</a:t>
+              <a:t>11/4/2014</a:t>
             </a:fld>
             <a:endParaRPr lang="en-US"/>
           </a:p>
@@ -2206,7 +2207,7 @@
           <a:p>
             <a:fld id="{A0F6182D-4BB0-4176-9A51-07A5F05FFC3D}" type="datetimeFigureOut">
               <a:rPr lang="en-US" smtClean="0"/>
-              <a:t>11/2/2014</a:t>
+              <a:t>11/4/2014</a:t>
             </a:fld>
             <a:endParaRPr lang="en-US"/>
           </a:p>
@@ -2324,7 +2325,7 @@
           <a:p>
             <a:fld id="{A0F6182D-4BB0-4176-9A51-07A5F05FFC3D}" type="datetimeFigureOut">
               <a:rPr lang="en-US" smtClean="0"/>
-              <a:t>11/2/2014</a:t>
+              <a:t>11/4/2014</a:t>
             </a:fld>
             <a:endParaRPr lang="en-US"/>
           </a:p>
@@ -2419,7 +2420,7 @@
           <a:p>
             <a:fld id="{A0F6182D-4BB0-4176-9A51-07A5F05FFC3D}" type="datetimeFigureOut">
               <a:rPr lang="en-US" smtClean="0"/>
-              <a:t>11/2/2014</a:t>
+              <a:t>11/4/2014</a:t>
             </a:fld>
             <a:endParaRPr lang="en-US"/>
           </a:p>
@@ -2696,7 +2697,7 @@
           <a:p>
             <a:fld id="{A0F6182D-4BB0-4176-9A51-07A5F05FFC3D}" type="datetimeFigureOut">
               <a:rPr lang="en-US" smtClean="0"/>
-              <a:t>11/2/2014</a:t>
+              <a:t>11/4/2014</a:t>
             </a:fld>
             <a:endParaRPr lang="en-US"/>
           </a:p>
@@ -2949,7 +2950,7 @@
           <a:p>
             <a:fld id="{A0F6182D-4BB0-4176-9A51-07A5F05FFC3D}" type="datetimeFigureOut">
               <a:rPr lang="en-US" smtClean="0"/>
-              <a:t>11/2/2014</a:t>
+              <a:t>11/4/2014</a:t>
             </a:fld>
             <a:endParaRPr lang="en-US"/>
           </a:p>
@@ -3162,7 +3163,7 @@
           <a:p>
             <a:fld id="{A0F6182D-4BB0-4176-9A51-07A5F05FFC3D}" type="datetimeFigureOut">
               <a:rPr lang="en-US" smtClean="0"/>
-              <a:t>11/2/2014</a:t>
+              <a:t>11/4/2014</a:t>
             </a:fld>
             <a:endParaRPr lang="en-US"/>
           </a:p>
@@ -6078,11 +6079,7 @@
             <a:pPr algn="ctr"/>
             <a:r>
               <a:rPr lang="en-US" sz="1600" b="1" dirty="0" smtClean="0"/>
-              <a:t>  </a:t>
-            </a:r>
-            <a:r>
-              <a:rPr lang="en-US" sz="1600" b="1" dirty="0" smtClean="0"/>
-              <a:t>Opened_Bay</a:t>
+              <a:t>  Opened_Bay</a:t>
             </a:r>
             <a:endParaRPr lang="en-US" sz="1600" b="1" dirty="0"/>
           </a:p>
@@ -6136,6 +6133,1457 @@
       </p:par>
     </p:tnLst>
   </p:timing>
+</p:sld>
+</file>
+
+<file path=ppt/slides/slide2.xml><?xml version="1.0" encoding="utf-8"?>
+<p:sld xmlns:a="http://schemas.openxmlformats.org/drawingml/2006/main" xmlns:r="http://schemas.openxmlformats.org/officeDocument/2006/relationships" xmlns:p="http://schemas.openxmlformats.org/presentationml/2006/main">
+  <p:cSld>
+    <p:spTree>
+      <p:nvGrpSpPr>
+        <p:cNvPr id="1" name=""/>
+        <p:cNvGrpSpPr/>
+        <p:nvPr/>
+      </p:nvGrpSpPr>
+      <p:grpSpPr>
+        <a:xfrm>
+          <a:off x="0" y="0"/>
+          <a:ext cx="0" cy="0"/>
+          <a:chOff x="0" y="0"/>
+          <a:chExt cx="0" cy="0"/>
+        </a:xfrm>
+      </p:grpSpPr>
+      <p:sp>
+        <p:nvSpPr>
+          <p:cNvPr id="4" name="Rectangle 3"/>
+          <p:cNvSpPr/>
+          <p:nvPr/>
+        </p:nvSpPr>
+        <p:spPr>
+          <a:xfrm>
+            <a:off x="6608711" y="12344400"/>
+            <a:ext cx="4023379" cy="1828800"/>
+          </a:xfrm>
+          <a:prstGeom prst="rect">
+            <a:avLst/>
+          </a:prstGeom>
+          <a:solidFill>
+            <a:schemeClr val="bg1"/>
+          </a:solidFill>
+          <a:ln w="28575" cmpd="dbl">
+            <a:solidFill>
+              <a:srgbClr val="C00000"/>
+            </a:solidFill>
+          </a:ln>
+        </p:spPr>
+        <p:style>
+          <a:lnRef idx="2">
+            <a:schemeClr val="dk1"/>
+          </a:lnRef>
+          <a:fillRef idx="1">
+            <a:schemeClr val="lt1"/>
+          </a:fillRef>
+          <a:effectRef idx="0">
+            <a:schemeClr val="dk1"/>
+          </a:effectRef>
+          <a:fontRef idx="minor">
+            <a:schemeClr val="dk1"/>
+          </a:fontRef>
+        </p:style>
+        <p:txBody>
+          <a:bodyPr rtlCol="0" anchor="ctr"/>
+          <a:lstStyle/>
+          <a:p>
+            <a:pPr algn="ctr"/>
+            <a:endParaRPr lang="en-US" sz="2400" b="1" u="sng" dirty="0" smtClean="0"/>
+          </a:p>
+          <a:p>
+            <a:pPr algn="ctr"/>
+            <a:endParaRPr lang="en-US" sz="2400" b="1" u="sng" dirty="0"/>
+          </a:p>
+          <a:p>
+            <a:pPr algn="ctr"/>
+            <a:endParaRPr lang="en-US" sz="2400" b="1" u="sng" dirty="0" smtClean="0"/>
+          </a:p>
+          <a:p>
+            <a:pPr algn="ctr"/>
+            <a:r>
+              <a:rPr lang="en-US" sz="2400" b="1" u="sng" dirty="0" smtClean="0"/>
+              <a:t>state: </a:t>
+            </a:r>
+            <a:r>
+              <a:rPr lang="en-US" sz="2400" b="1" u="sng" dirty="0" smtClean="0"/>
+              <a:t>POWER_OFF</a:t>
+            </a:r>
+            <a:endParaRPr lang="en-US" sz="2400" b="1" u="sng" dirty="0" smtClean="0"/>
+          </a:p>
+          <a:p>
+            <a:pPr algn="ctr"/>
+            <a:r>
+              <a:rPr lang="en-US" sz="2000" dirty="0" smtClean="0"/>
+              <a:t>The system is in the OFF state. There is no current flowing through the circuitry and there are no moving parts.</a:t>
+            </a:r>
+            <a:endParaRPr lang="en-US" sz="2000" dirty="0"/>
+          </a:p>
+          <a:p>
+            <a:pPr algn="ctr"/>
+            <a:endParaRPr lang="en-US" sz="2400" dirty="0" smtClean="0"/>
+          </a:p>
+          <a:p>
+            <a:pPr algn="ctr"/>
+            <a:endParaRPr lang="en-US" sz="2400" dirty="0"/>
+          </a:p>
+          <a:p>
+            <a:pPr algn="ctr"/>
+            <a:endParaRPr lang="en-US" sz="2400" dirty="0"/>
+          </a:p>
+        </p:txBody>
+      </p:sp>
+      <p:sp>
+        <p:nvSpPr>
+          <p:cNvPr id="5" name="Rectangle 4"/>
+          <p:cNvSpPr/>
+          <p:nvPr/>
+        </p:nvSpPr>
+        <p:spPr>
+          <a:xfrm>
+            <a:off x="2362200" y="3962400"/>
+            <a:ext cx="13106400" cy="7467600"/>
+          </a:xfrm>
+          <a:prstGeom prst="rect">
+            <a:avLst/>
+          </a:prstGeom>
+          <a:solidFill>
+            <a:schemeClr val="bg1"/>
+          </a:solidFill>
+          <a:ln w="25400" cmpd="dbl">
+            <a:solidFill>
+              <a:srgbClr val="00B050"/>
+            </a:solidFill>
+          </a:ln>
+        </p:spPr>
+        <p:style>
+          <a:lnRef idx="2">
+            <a:schemeClr val="dk1"/>
+          </a:lnRef>
+          <a:fillRef idx="1">
+            <a:schemeClr val="lt1"/>
+          </a:fillRef>
+          <a:effectRef idx="0">
+            <a:schemeClr val="dk1"/>
+          </a:effectRef>
+          <a:fontRef idx="minor">
+            <a:schemeClr val="dk1"/>
+          </a:fontRef>
+        </p:style>
+        <p:txBody>
+          <a:bodyPr rtlCol="0" anchor="ctr"/>
+          <a:lstStyle/>
+          <a:p>
+            <a:endParaRPr lang="en-US" sz="2400" b="1" u="sng" dirty="0" smtClean="0"/>
+          </a:p>
+          <a:p>
+            <a:endParaRPr lang="en-US" sz="2400" b="1" u="sng" dirty="0" smtClean="0"/>
+          </a:p>
+          <a:p>
+            <a:r>
+              <a:rPr lang="en-US" sz="2400" b="1" dirty="0" smtClean="0"/>
+              <a:t>              </a:t>
+            </a:r>
+          </a:p>
+          <a:p>
+            <a:endParaRPr lang="en-US" sz="2400" b="1" u="sng" dirty="0"/>
+          </a:p>
+          <a:p>
+            <a:r>
+              <a:rPr lang="en-US" sz="2400" b="1" dirty="0" smtClean="0"/>
+              <a:t>               </a:t>
+            </a:r>
+            <a:endParaRPr lang="en-US" sz="2400" b="1" dirty="0" smtClean="0"/>
+          </a:p>
+          <a:p>
+            <a:r>
+              <a:rPr lang="en-US" sz="2400" b="1" u="sng" dirty="0" smtClean="0"/>
+              <a:t>state</a:t>
+            </a:r>
+            <a:r>
+              <a:rPr lang="en-US" sz="2400" b="1" u="sng" dirty="0" smtClean="0"/>
+              <a:t>: </a:t>
+            </a:r>
+            <a:r>
+              <a:rPr lang="en-US" sz="2400" b="1" u="sng" dirty="0" smtClean="0"/>
+              <a:t>POWER_ON</a:t>
+            </a:r>
+          </a:p>
+          <a:p>
+            <a:endParaRPr lang="en-US" sz="2400" b="1" u="sng" dirty="0"/>
+          </a:p>
+          <a:p>
+            <a:endParaRPr lang="en-US" sz="2400" b="1" u="sng" dirty="0" smtClean="0"/>
+          </a:p>
+          <a:p>
+            <a:endParaRPr lang="en-US" sz="2400" b="1" u="sng" dirty="0"/>
+          </a:p>
+          <a:p>
+            <a:endParaRPr lang="en-US" sz="2400" b="1" u="sng" dirty="0" smtClean="0"/>
+          </a:p>
+          <a:p>
+            <a:endParaRPr lang="en-US" sz="2400" b="1" u="sng" dirty="0"/>
+          </a:p>
+          <a:p>
+            <a:endParaRPr lang="en-US" sz="2400" b="1" u="sng" dirty="0" smtClean="0"/>
+          </a:p>
+          <a:p>
+            <a:endParaRPr lang="en-US" sz="2400" b="1" u="sng" dirty="0"/>
+          </a:p>
+          <a:p>
+            <a:endParaRPr lang="en-US" sz="2400" b="1" u="sng" dirty="0" smtClean="0"/>
+          </a:p>
+          <a:p>
+            <a:endParaRPr lang="en-US" sz="2400" b="1" u="sng" dirty="0"/>
+          </a:p>
+          <a:p>
+            <a:endParaRPr lang="en-US" sz="2400" b="1" u="sng" dirty="0" smtClean="0"/>
+          </a:p>
+          <a:p>
+            <a:endParaRPr lang="en-US" sz="2400" b="1" u="sng" dirty="0" smtClean="0"/>
+          </a:p>
+          <a:p>
+            <a:endParaRPr lang="en-US" sz="2400" b="1" u="sng" dirty="0"/>
+          </a:p>
+          <a:p>
+            <a:endParaRPr lang="en-US" sz="2400" b="1" u="sng" dirty="0" smtClean="0"/>
+          </a:p>
+          <a:p>
+            <a:endParaRPr lang="en-US" sz="2400" b="1" u="sng" dirty="0"/>
+          </a:p>
+          <a:p>
+            <a:endParaRPr lang="en-US" sz="2400" b="1" u="sng" dirty="0" smtClean="0"/>
+          </a:p>
+          <a:p>
+            <a:endParaRPr lang="en-US" sz="2400" b="1" u="sng" dirty="0" smtClean="0"/>
+          </a:p>
+          <a:p>
+            <a:endParaRPr lang="en-US" sz="2400" b="1" u="sng" dirty="0"/>
+          </a:p>
+          <a:p>
+            <a:endParaRPr lang="en-US" sz="2400" b="1" u="sng" dirty="0" smtClean="0"/>
+          </a:p>
+          <a:p>
+            <a:endParaRPr lang="en-US" sz="2400" b="1" u="sng" dirty="0"/>
+          </a:p>
+          <a:p>
+            <a:endParaRPr lang="en-US" sz="2400" b="1" u="sng" dirty="0" smtClean="0"/>
+          </a:p>
+          <a:p>
+            <a:endParaRPr lang="en-US" sz="2400" dirty="0"/>
+          </a:p>
+          <a:p>
+            <a:endParaRPr lang="en-US" sz="2400" dirty="0" smtClean="0"/>
+          </a:p>
+          <a:p>
+            <a:endParaRPr lang="en-US" sz="2400" dirty="0"/>
+          </a:p>
+          <a:p>
+            <a:endParaRPr lang="en-US" sz="2400" dirty="0"/>
+          </a:p>
+        </p:txBody>
+      </p:sp>
+      <p:sp>
+        <p:nvSpPr>
+          <p:cNvPr id="6" name="Rectangle 5"/>
+          <p:cNvSpPr/>
+          <p:nvPr/>
+        </p:nvSpPr>
+        <p:spPr>
+          <a:xfrm>
+            <a:off x="3068603" y="9314713"/>
+            <a:ext cx="3542031" cy="1935794"/>
+          </a:xfrm>
+          <a:prstGeom prst="rect">
+            <a:avLst/>
+          </a:prstGeom>
+          <a:solidFill>
+            <a:schemeClr val="bg1"/>
+          </a:solidFill>
+          <a:ln w="15875" cmpd="dbl"/>
+        </p:spPr>
+        <p:style>
+          <a:lnRef idx="2">
+            <a:schemeClr val="dk1"/>
+          </a:lnRef>
+          <a:fillRef idx="1">
+            <a:schemeClr val="lt1"/>
+          </a:fillRef>
+          <a:effectRef idx="0">
+            <a:schemeClr val="dk1"/>
+          </a:effectRef>
+          <a:fontRef idx="minor">
+            <a:schemeClr val="dk1"/>
+          </a:fontRef>
+        </p:style>
+        <p:txBody>
+          <a:bodyPr rtlCol="0" anchor="ctr"/>
+          <a:lstStyle/>
+          <a:p>
+            <a:pPr algn="ctr"/>
+            <a:r>
+              <a:rPr lang="en-US" sz="2400" b="1" u="sng" dirty="0"/>
+              <a:t>s</a:t>
+            </a:r>
+            <a:r>
+              <a:rPr lang="en-US" sz="2400" b="1" u="sng" dirty="0" smtClean="0"/>
+              <a:t>tate: Init</a:t>
+            </a:r>
+          </a:p>
+          <a:p>
+            <a:pPr algn="ctr"/>
+            <a:r>
+              <a:rPr lang="en-US" sz="2000" dirty="0" smtClean="0"/>
+              <a:t>This is the initialization phase of the payload bay system. This state tests the payload bay electronics and safe, timely operation.</a:t>
+            </a:r>
+            <a:endParaRPr lang="en-US" sz="2000" dirty="0"/>
+          </a:p>
+        </p:txBody>
+      </p:sp>
+      <p:sp>
+        <p:nvSpPr>
+          <p:cNvPr id="7" name="Rectangle 6"/>
+          <p:cNvSpPr/>
+          <p:nvPr/>
+        </p:nvSpPr>
+        <p:spPr>
+          <a:xfrm>
+            <a:off x="10515600" y="8023703"/>
+            <a:ext cx="4810572" cy="2545394"/>
+          </a:xfrm>
+          <a:prstGeom prst="rect">
+            <a:avLst/>
+          </a:prstGeom>
+          <a:solidFill>
+            <a:schemeClr val="bg1"/>
+          </a:solidFill>
+          <a:ln w="15875" cmpd="dbl"/>
+        </p:spPr>
+        <p:style>
+          <a:lnRef idx="2">
+            <a:schemeClr val="dk1"/>
+          </a:lnRef>
+          <a:fillRef idx="1">
+            <a:schemeClr val="lt1"/>
+          </a:fillRef>
+          <a:effectRef idx="0">
+            <a:schemeClr val="dk1"/>
+          </a:effectRef>
+          <a:fontRef idx="minor">
+            <a:schemeClr val="dk1"/>
+          </a:fontRef>
+        </p:style>
+        <p:txBody>
+          <a:bodyPr rtlCol="0" anchor="ctr"/>
+          <a:lstStyle/>
+          <a:p>
+            <a:pPr algn="ctr"/>
+            <a:r>
+              <a:rPr lang="en-US" sz="2400" b="1" u="sng" dirty="0"/>
+              <a:t>s</a:t>
+            </a:r>
+            <a:r>
+              <a:rPr lang="en-US" sz="2400" b="1" u="sng" dirty="0" smtClean="0"/>
+              <a:t>tate: Closed_Bay</a:t>
+            </a:r>
+          </a:p>
+          <a:p>
+            <a:pPr algn="ctr"/>
+            <a:r>
+              <a:rPr lang="en-US" sz="2000" dirty="0" smtClean="0"/>
+              <a:t>The Payload bay is completely closed. This state is reached when either (1) the sample is retrieved by the AGSE and secured in the bay or (2) t</a:t>
+            </a:r>
+            <a:r>
+              <a:rPr lang="en-US" sz="2000" dirty="0" smtClean="0"/>
+              <a:t>he bay is closed after successful initialization.</a:t>
+            </a:r>
+            <a:endParaRPr lang="en-US" sz="2000" dirty="0"/>
+          </a:p>
+        </p:txBody>
+      </p:sp>
+      <p:sp>
+        <p:nvSpPr>
+          <p:cNvPr id="8" name="Rectangle 7"/>
+          <p:cNvSpPr/>
+          <p:nvPr/>
+        </p:nvSpPr>
+        <p:spPr>
+          <a:xfrm>
+            <a:off x="2514600" y="4648200"/>
+            <a:ext cx="6601657" cy="4114800"/>
+          </a:xfrm>
+          <a:prstGeom prst="rect">
+            <a:avLst/>
+          </a:prstGeom>
+          <a:solidFill>
+            <a:schemeClr val="bg1"/>
+          </a:solidFill>
+          <a:ln w="15875" cmpd="dbl"/>
+        </p:spPr>
+        <p:style>
+          <a:lnRef idx="2">
+            <a:schemeClr val="dk1"/>
+          </a:lnRef>
+          <a:fillRef idx="1">
+            <a:schemeClr val="lt1"/>
+          </a:fillRef>
+          <a:effectRef idx="0">
+            <a:schemeClr val="dk1"/>
+          </a:effectRef>
+          <a:fontRef idx="minor">
+            <a:schemeClr val="dk1"/>
+          </a:fontRef>
+        </p:style>
+        <p:txBody>
+          <a:bodyPr rtlCol="0" anchor="ctr"/>
+          <a:lstStyle/>
+          <a:p>
+            <a:pPr algn="ctr"/>
+            <a:r>
+              <a:rPr lang="en-US" sz="2400" b="1" u="sng" dirty="0"/>
+              <a:t>s</a:t>
+            </a:r>
+            <a:r>
+              <a:rPr lang="en-US" sz="2400" b="1" u="sng" dirty="0" smtClean="0"/>
+              <a:t>tate: Opened_Bay</a:t>
+            </a:r>
+          </a:p>
+          <a:p>
+            <a:pPr algn="ctr"/>
+            <a:endParaRPr lang="en-US" sz="2400" b="1" u="sng" dirty="0" smtClean="0"/>
+          </a:p>
+          <a:p>
+            <a:pPr algn="ctr"/>
+            <a:endParaRPr lang="en-US" sz="2400" b="1" u="sng" dirty="0"/>
+          </a:p>
+          <a:p>
+            <a:pPr algn="ctr"/>
+            <a:endParaRPr lang="en-US" sz="2400" b="1" u="sng" dirty="0"/>
+          </a:p>
+          <a:p>
+            <a:pPr algn="ctr"/>
+            <a:endParaRPr lang="en-US" sz="2400" b="1" u="sng" dirty="0" smtClean="0"/>
+          </a:p>
+          <a:p>
+            <a:pPr algn="ctr"/>
+            <a:endParaRPr lang="en-US" sz="2400" b="1" u="sng" dirty="0"/>
+          </a:p>
+          <a:p>
+            <a:pPr algn="ctr"/>
+            <a:endParaRPr lang="en-US" sz="2400" b="1" u="sng" dirty="0" smtClean="0"/>
+          </a:p>
+          <a:p>
+            <a:pPr algn="ctr"/>
+            <a:endParaRPr lang="en-US" sz="2400" b="1" u="sng" dirty="0"/>
+          </a:p>
+          <a:p>
+            <a:pPr algn="ctr"/>
+            <a:endParaRPr lang="en-US" sz="2400" b="1" u="sng" dirty="0" smtClean="0"/>
+          </a:p>
+          <a:p>
+            <a:pPr algn="ctr"/>
+            <a:endParaRPr lang="en-US" sz="2400" b="1" u="sng" dirty="0"/>
+          </a:p>
+        </p:txBody>
+      </p:sp>
+      <p:sp>
+        <p:nvSpPr>
+          <p:cNvPr id="9" name="Rectangle 8"/>
+          <p:cNvSpPr/>
+          <p:nvPr/>
+        </p:nvSpPr>
+        <p:spPr>
+          <a:xfrm>
+            <a:off x="2722992" y="6585919"/>
+            <a:ext cx="1991172" cy="1092433"/>
+          </a:xfrm>
+          <a:prstGeom prst="rect">
+            <a:avLst/>
+          </a:prstGeom>
+          <a:solidFill>
+            <a:schemeClr val="bg1"/>
+          </a:solidFill>
+          <a:ln w="15875" cmpd="dbl"/>
+        </p:spPr>
+        <p:style>
+          <a:lnRef idx="2">
+            <a:schemeClr val="dk1"/>
+          </a:lnRef>
+          <a:fillRef idx="1">
+            <a:schemeClr val="lt1"/>
+          </a:fillRef>
+          <a:effectRef idx="0">
+            <a:schemeClr val="dk1"/>
+          </a:effectRef>
+          <a:fontRef idx="minor">
+            <a:schemeClr val="dk1"/>
+          </a:fontRef>
+        </p:style>
+        <p:txBody>
+          <a:bodyPr rtlCol="0" anchor="ctr"/>
+          <a:lstStyle/>
+          <a:p>
+            <a:pPr algn="ctr"/>
+            <a:r>
+              <a:rPr lang="en-US" sz="2400" b="1" u="sng" dirty="0"/>
+              <a:t>s</a:t>
+            </a:r>
+            <a:r>
+              <a:rPr lang="en-US" sz="2400" b="1" u="sng" dirty="0" smtClean="0"/>
+              <a:t>tate: Fully_Open</a:t>
+            </a:r>
+            <a:endParaRPr lang="en-US" sz="2400" b="1" u="sng" dirty="0"/>
+          </a:p>
+        </p:txBody>
+      </p:sp>
+      <p:sp>
+        <p:nvSpPr>
+          <p:cNvPr id="10" name="Rectangle 9"/>
+          <p:cNvSpPr/>
+          <p:nvPr/>
+        </p:nvSpPr>
+        <p:spPr>
+          <a:xfrm>
+            <a:off x="5851346" y="5613167"/>
+            <a:ext cx="2209800" cy="1092433"/>
+          </a:xfrm>
+          <a:prstGeom prst="rect">
+            <a:avLst/>
+          </a:prstGeom>
+          <a:solidFill>
+            <a:schemeClr val="bg1"/>
+          </a:solidFill>
+          <a:ln w="15875" cmpd="dbl"/>
+        </p:spPr>
+        <p:style>
+          <a:lnRef idx="2">
+            <a:schemeClr val="dk1"/>
+          </a:lnRef>
+          <a:fillRef idx="1">
+            <a:schemeClr val="lt1"/>
+          </a:fillRef>
+          <a:effectRef idx="0">
+            <a:schemeClr val="dk1"/>
+          </a:effectRef>
+          <a:fontRef idx="minor">
+            <a:schemeClr val="dk1"/>
+          </a:fontRef>
+        </p:style>
+        <p:txBody>
+          <a:bodyPr rtlCol="0" anchor="ctr"/>
+          <a:lstStyle/>
+          <a:p>
+            <a:pPr algn="ctr"/>
+            <a:r>
+              <a:rPr lang="en-US" sz="2400" b="1" u="sng" dirty="0"/>
+              <a:t>s</a:t>
+            </a:r>
+            <a:r>
+              <a:rPr lang="en-US" sz="2400" b="1" u="sng" dirty="0" smtClean="0"/>
+              <a:t>tate: Opening</a:t>
+            </a:r>
+            <a:endParaRPr lang="en-US" sz="2400" b="1" u="sng" dirty="0"/>
+          </a:p>
+        </p:txBody>
+      </p:sp>
+      <p:sp>
+        <p:nvSpPr>
+          <p:cNvPr id="11" name="Rectangle 10"/>
+          <p:cNvSpPr/>
+          <p:nvPr/>
+        </p:nvSpPr>
+        <p:spPr>
+          <a:xfrm>
+            <a:off x="5960660" y="7433786"/>
+            <a:ext cx="1991172" cy="1092433"/>
+          </a:xfrm>
+          <a:prstGeom prst="rect">
+            <a:avLst/>
+          </a:prstGeom>
+          <a:solidFill>
+            <a:schemeClr val="bg1"/>
+          </a:solidFill>
+          <a:ln w="15875" cmpd="dbl"/>
+        </p:spPr>
+        <p:style>
+          <a:lnRef idx="2">
+            <a:schemeClr val="dk1"/>
+          </a:lnRef>
+          <a:fillRef idx="1">
+            <a:schemeClr val="lt1"/>
+          </a:fillRef>
+          <a:effectRef idx="0">
+            <a:schemeClr val="dk1"/>
+          </a:effectRef>
+          <a:fontRef idx="minor">
+            <a:schemeClr val="dk1"/>
+          </a:fontRef>
+        </p:style>
+        <p:txBody>
+          <a:bodyPr rtlCol="0" anchor="ctr"/>
+          <a:lstStyle/>
+          <a:p>
+            <a:pPr algn="ctr"/>
+            <a:r>
+              <a:rPr lang="en-US" sz="2400" b="1" u="sng" dirty="0"/>
+              <a:t>s</a:t>
+            </a:r>
+            <a:r>
+              <a:rPr lang="en-US" sz="2400" b="1" u="sng" dirty="0" smtClean="0"/>
+              <a:t>tate: Closing</a:t>
+            </a:r>
+            <a:endParaRPr lang="en-US" sz="2400" b="1" u="sng" dirty="0"/>
+          </a:p>
+        </p:txBody>
+      </p:sp>
+      <p:cxnSp>
+        <p:nvCxnSpPr>
+          <p:cNvPr id="12" name="Curved Connector 11"/>
+          <p:cNvCxnSpPr>
+            <a:stCxn id="4" idx="1"/>
+          </p:cNvCxnSpPr>
+          <p:nvPr/>
+        </p:nvCxnSpPr>
+        <p:spPr>
+          <a:xfrm rot="10800000">
+            <a:off x="5535741" y="11232194"/>
+            <a:ext cx="1072970" cy="2026606"/>
+          </a:xfrm>
+          <a:prstGeom prst="curvedConnector2">
+            <a:avLst/>
+          </a:prstGeom>
+          <a:ln w="12700">
+            <a:solidFill>
+              <a:srgbClr val="FF0000"/>
+            </a:solidFill>
+            <a:tailEnd type="arrow"/>
+          </a:ln>
+        </p:spPr>
+        <p:style>
+          <a:lnRef idx="2">
+            <a:schemeClr val="accent2"/>
+          </a:lnRef>
+          <a:fillRef idx="0">
+            <a:schemeClr val="accent2"/>
+          </a:fillRef>
+          <a:effectRef idx="1">
+            <a:schemeClr val="accent2"/>
+          </a:effectRef>
+          <a:fontRef idx="minor">
+            <a:schemeClr val="tx1"/>
+          </a:fontRef>
+        </p:style>
+      </p:cxnSp>
+      <p:cxnSp>
+        <p:nvCxnSpPr>
+          <p:cNvPr id="15" name="Curved Connector 14"/>
+          <p:cNvCxnSpPr/>
+          <p:nvPr/>
+        </p:nvCxnSpPr>
+        <p:spPr>
+          <a:xfrm flipV="1">
+            <a:off x="6608711" y="10282610"/>
+            <a:ext cx="3906889" cy="814009"/>
+          </a:xfrm>
+          <a:prstGeom prst="curvedConnector3">
+            <a:avLst>
+              <a:gd name="adj1" fmla="val 50000"/>
+            </a:avLst>
+          </a:prstGeom>
+          <a:ln w="12700">
+            <a:solidFill>
+              <a:srgbClr val="FF0000"/>
+            </a:solidFill>
+            <a:tailEnd type="arrow"/>
+          </a:ln>
+        </p:spPr>
+        <p:style>
+          <a:lnRef idx="2">
+            <a:schemeClr val="accent2"/>
+          </a:lnRef>
+          <a:fillRef idx="0">
+            <a:schemeClr val="accent2"/>
+          </a:fillRef>
+          <a:effectRef idx="1">
+            <a:schemeClr val="accent2"/>
+          </a:effectRef>
+          <a:fontRef idx="minor">
+            <a:schemeClr val="tx1"/>
+          </a:fontRef>
+        </p:style>
+      </p:cxnSp>
+      <p:sp>
+        <p:nvSpPr>
+          <p:cNvPr id="18" name="TextBox 17"/>
+          <p:cNvSpPr txBox="1"/>
+          <p:nvPr/>
+        </p:nvSpPr>
+        <p:spPr>
+          <a:xfrm>
+            <a:off x="4784961" y="12358308"/>
+            <a:ext cx="1128527" cy="307777"/>
+          </a:xfrm>
+          <a:prstGeom prst="rect">
+            <a:avLst/>
+          </a:prstGeom>
+          <a:noFill/>
+        </p:spPr>
+        <p:txBody>
+          <a:bodyPr wrap="square" rtlCol="0">
+            <a:spAutoFit/>
+          </a:bodyPr>
+          <a:lstStyle/>
+          <a:p>
+            <a:r>
+              <a:rPr lang="en-US" sz="1400" b="1" dirty="0" smtClean="0"/>
+              <a:t>    PowerON</a:t>
+            </a:r>
+            <a:endParaRPr lang="en-US" sz="1400" b="1" dirty="0"/>
+          </a:p>
+        </p:txBody>
+      </p:sp>
+      <p:sp>
+        <p:nvSpPr>
+          <p:cNvPr id="19" name="TextBox 18"/>
+          <p:cNvSpPr txBox="1"/>
+          <p:nvPr/>
+        </p:nvSpPr>
+        <p:spPr>
+          <a:xfrm>
+            <a:off x="8437532" y="10569097"/>
+            <a:ext cx="2212971" cy="307777"/>
+          </a:xfrm>
+          <a:prstGeom prst="rect">
+            <a:avLst/>
+          </a:prstGeom>
+          <a:noFill/>
+        </p:spPr>
+        <p:txBody>
+          <a:bodyPr wrap="square" rtlCol="0">
+            <a:spAutoFit/>
+          </a:bodyPr>
+          <a:lstStyle/>
+          <a:p>
+            <a:r>
+              <a:rPr lang="en-US" sz="1400" b="1" dirty="0" smtClean="0"/>
+              <a:t>    </a:t>
+            </a:r>
+            <a:r>
+              <a:rPr lang="en-US" sz="1400" b="1" dirty="0" smtClean="0"/>
+              <a:t>Init_Tests = true</a:t>
+            </a:r>
+            <a:endParaRPr lang="en-US" sz="1400" b="1" dirty="0"/>
+          </a:p>
+        </p:txBody>
+      </p:sp>
+      <p:cxnSp>
+        <p:nvCxnSpPr>
+          <p:cNvPr id="20" name="Curved Connector 19"/>
+          <p:cNvCxnSpPr>
+            <a:stCxn id="7" idx="0"/>
+            <a:endCxn id="10" idx="3"/>
+          </p:cNvCxnSpPr>
+          <p:nvPr/>
+        </p:nvCxnSpPr>
+        <p:spPr>
+          <a:xfrm rot="16200000" flipV="1">
+            <a:off x="9558857" y="4661674"/>
+            <a:ext cx="1864319" cy="4859740"/>
+          </a:xfrm>
+          <a:prstGeom prst="curvedConnector2">
+            <a:avLst/>
+          </a:prstGeom>
+          <a:ln w="12700">
+            <a:solidFill>
+              <a:srgbClr val="FF0000"/>
+            </a:solidFill>
+            <a:tailEnd type="arrow"/>
+          </a:ln>
+        </p:spPr>
+        <p:style>
+          <a:lnRef idx="2">
+            <a:schemeClr val="accent2"/>
+          </a:lnRef>
+          <a:fillRef idx="0">
+            <a:schemeClr val="accent2"/>
+          </a:fillRef>
+          <a:effectRef idx="1">
+            <a:schemeClr val="accent2"/>
+          </a:effectRef>
+          <a:fontRef idx="minor">
+            <a:schemeClr val="tx1"/>
+          </a:fontRef>
+        </p:style>
+      </p:cxnSp>
+      <p:cxnSp>
+        <p:nvCxnSpPr>
+          <p:cNvPr id="24" name="Curved Connector 23"/>
+          <p:cNvCxnSpPr>
+            <a:stCxn id="10" idx="1"/>
+            <a:endCxn id="9" idx="0"/>
+          </p:cNvCxnSpPr>
+          <p:nvPr/>
+        </p:nvCxnSpPr>
+        <p:spPr>
+          <a:xfrm rot="10800000" flipV="1">
+            <a:off x="3718578" y="6159383"/>
+            <a:ext cx="2132768" cy="426535"/>
+          </a:xfrm>
+          <a:prstGeom prst="curvedConnector2">
+            <a:avLst/>
+          </a:prstGeom>
+          <a:ln w="12700">
+            <a:solidFill>
+              <a:srgbClr val="FF0000"/>
+            </a:solidFill>
+            <a:tailEnd type="arrow"/>
+          </a:ln>
+        </p:spPr>
+        <p:style>
+          <a:lnRef idx="2">
+            <a:schemeClr val="accent2"/>
+          </a:lnRef>
+          <a:fillRef idx="0">
+            <a:schemeClr val="accent2"/>
+          </a:fillRef>
+          <a:effectRef idx="1">
+            <a:schemeClr val="accent2"/>
+          </a:effectRef>
+          <a:fontRef idx="minor">
+            <a:schemeClr val="tx1"/>
+          </a:fontRef>
+        </p:style>
+      </p:cxnSp>
+      <p:cxnSp>
+        <p:nvCxnSpPr>
+          <p:cNvPr id="27" name="Curved Connector 26"/>
+          <p:cNvCxnSpPr>
+            <a:stCxn id="9" idx="2"/>
+            <a:endCxn id="11" idx="1"/>
+          </p:cNvCxnSpPr>
+          <p:nvPr/>
+        </p:nvCxnSpPr>
+        <p:spPr>
+          <a:xfrm rot="16200000" flipH="1">
+            <a:off x="4688794" y="6708136"/>
+            <a:ext cx="301651" cy="2242082"/>
+          </a:xfrm>
+          <a:prstGeom prst="curvedConnector2">
+            <a:avLst/>
+          </a:prstGeom>
+          <a:ln w="12700">
+            <a:solidFill>
+              <a:srgbClr val="FF0000"/>
+            </a:solidFill>
+            <a:tailEnd type="arrow"/>
+          </a:ln>
+        </p:spPr>
+        <p:style>
+          <a:lnRef idx="2">
+            <a:schemeClr val="accent2"/>
+          </a:lnRef>
+          <a:fillRef idx="0">
+            <a:schemeClr val="accent2"/>
+          </a:fillRef>
+          <a:effectRef idx="1">
+            <a:schemeClr val="accent2"/>
+          </a:effectRef>
+          <a:fontRef idx="minor">
+            <a:schemeClr val="tx1"/>
+          </a:fontRef>
+        </p:style>
+      </p:cxnSp>
+      <p:cxnSp>
+        <p:nvCxnSpPr>
+          <p:cNvPr id="30" name="Curved Connector 29"/>
+          <p:cNvCxnSpPr>
+            <a:stCxn id="11" idx="3"/>
+          </p:cNvCxnSpPr>
+          <p:nvPr/>
+        </p:nvCxnSpPr>
+        <p:spPr>
+          <a:xfrm>
+            <a:off x="7951832" y="7980003"/>
+            <a:ext cx="2563768" cy="1773597"/>
+          </a:xfrm>
+          <a:prstGeom prst="curvedConnector3">
+            <a:avLst>
+              <a:gd name="adj1" fmla="val 50000"/>
+            </a:avLst>
+          </a:prstGeom>
+          <a:ln w="12700">
+            <a:solidFill>
+              <a:srgbClr val="FF0000"/>
+            </a:solidFill>
+            <a:tailEnd type="arrow"/>
+          </a:ln>
+        </p:spPr>
+        <p:style>
+          <a:lnRef idx="2">
+            <a:schemeClr val="accent2"/>
+          </a:lnRef>
+          <a:fillRef idx="0">
+            <a:schemeClr val="accent2"/>
+          </a:fillRef>
+          <a:effectRef idx="1">
+            <a:schemeClr val="accent2"/>
+          </a:effectRef>
+          <a:fontRef idx="minor">
+            <a:schemeClr val="tx1"/>
+          </a:fontRef>
+        </p:style>
+      </p:cxnSp>
+      <p:sp>
+        <p:nvSpPr>
+          <p:cNvPr id="33" name="TextBox 32"/>
+          <p:cNvSpPr txBox="1"/>
+          <p:nvPr/>
+        </p:nvSpPr>
+        <p:spPr>
+          <a:xfrm>
+            <a:off x="12920886" y="7524463"/>
+            <a:ext cx="1805365" cy="307777"/>
+          </a:xfrm>
+          <a:prstGeom prst="rect">
+            <a:avLst/>
+          </a:prstGeom>
+          <a:noFill/>
+        </p:spPr>
+        <p:txBody>
+          <a:bodyPr wrap="square" rtlCol="0">
+            <a:spAutoFit/>
+          </a:bodyPr>
+          <a:lstStyle/>
+          <a:p>
+            <a:r>
+              <a:rPr lang="en-US" sz="1400" b="1" dirty="0" smtClean="0"/>
+              <a:t>AGSE_Trigger = OPEN</a:t>
+            </a:r>
+            <a:endParaRPr lang="en-US" sz="1400" b="1" dirty="0"/>
+          </a:p>
+        </p:txBody>
+      </p:sp>
+      <p:sp>
+        <p:nvSpPr>
+          <p:cNvPr id="34" name="TextBox 33"/>
+          <p:cNvSpPr txBox="1"/>
+          <p:nvPr/>
+        </p:nvSpPr>
+        <p:spPr>
+          <a:xfrm>
+            <a:off x="3287327" y="5643248"/>
+            <a:ext cx="2172665" cy="523220"/>
+          </a:xfrm>
+          <a:prstGeom prst="rect">
+            <a:avLst/>
+          </a:prstGeom>
+          <a:noFill/>
+        </p:spPr>
+        <p:txBody>
+          <a:bodyPr wrap="square" rtlCol="0">
+            <a:spAutoFit/>
+          </a:bodyPr>
+          <a:lstStyle/>
+          <a:p>
+            <a:r>
+              <a:rPr lang="en-US" sz="1400" b="1" dirty="0" smtClean="0"/>
+              <a:t>Limit_Switch_1_Reached &amp;&amp; Timeout_Expiry = false </a:t>
+            </a:r>
+            <a:endParaRPr lang="en-US" sz="1400" b="1" dirty="0"/>
+          </a:p>
+        </p:txBody>
+      </p:sp>
+      <p:sp>
+        <p:nvSpPr>
+          <p:cNvPr id="35" name="TextBox 34"/>
+          <p:cNvSpPr txBox="1"/>
+          <p:nvPr/>
+        </p:nvSpPr>
+        <p:spPr>
+          <a:xfrm>
+            <a:off x="3413319" y="7977200"/>
+            <a:ext cx="1920682" cy="307777"/>
+          </a:xfrm>
+          <a:prstGeom prst="rect">
+            <a:avLst/>
+          </a:prstGeom>
+          <a:noFill/>
+        </p:spPr>
+        <p:txBody>
+          <a:bodyPr wrap="square" rtlCol="0">
+            <a:spAutoFit/>
+          </a:bodyPr>
+          <a:lstStyle/>
+          <a:p>
+            <a:r>
+              <a:rPr lang="en-US" sz="1400" b="1" dirty="0" smtClean="0"/>
+              <a:t>AGSE_Trigger = CLOSE</a:t>
+            </a:r>
+            <a:endParaRPr lang="en-US" sz="1400" b="1" dirty="0"/>
+          </a:p>
+        </p:txBody>
+      </p:sp>
+      <p:sp>
+        <p:nvSpPr>
+          <p:cNvPr id="36" name="TextBox 35"/>
+          <p:cNvSpPr txBox="1"/>
+          <p:nvPr/>
+        </p:nvSpPr>
+        <p:spPr>
+          <a:xfrm>
+            <a:off x="8192573" y="9743882"/>
+            <a:ext cx="2340087" cy="307777"/>
+          </a:xfrm>
+          <a:prstGeom prst="rect">
+            <a:avLst/>
+          </a:prstGeom>
+          <a:noFill/>
+        </p:spPr>
+        <p:txBody>
+          <a:bodyPr wrap="square" rtlCol="0">
+            <a:spAutoFit/>
+          </a:bodyPr>
+          <a:lstStyle/>
+          <a:p>
+            <a:pPr algn="ctr"/>
+            <a:r>
+              <a:rPr lang="en-US" sz="1400" b="1" dirty="0" smtClean="0"/>
+              <a:t>Limit_Switch_2_Reached</a:t>
+            </a:r>
+            <a:endParaRPr lang="en-US" sz="1400" b="1" dirty="0"/>
+          </a:p>
+        </p:txBody>
+      </p:sp>
+      <p:cxnSp>
+        <p:nvCxnSpPr>
+          <p:cNvPr id="40" name="Curved Connector 39"/>
+          <p:cNvCxnSpPr>
+            <a:endCxn id="4" idx="3"/>
+          </p:cNvCxnSpPr>
+          <p:nvPr/>
+        </p:nvCxnSpPr>
+        <p:spPr>
+          <a:xfrm rot="5400000">
+            <a:off x="10345245" y="11716845"/>
+            <a:ext cx="1828800" cy="1255110"/>
+          </a:xfrm>
+          <a:prstGeom prst="curvedConnector2">
+            <a:avLst/>
+          </a:prstGeom>
+          <a:ln w="12700">
+            <a:solidFill>
+              <a:srgbClr val="FF0000"/>
+            </a:solidFill>
+            <a:tailEnd type="arrow"/>
+          </a:ln>
+        </p:spPr>
+        <p:style>
+          <a:lnRef idx="2">
+            <a:schemeClr val="accent2"/>
+          </a:lnRef>
+          <a:fillRef idx="0">
+            <a:schemeClr val="accent2"/>
+          </a:fillRef>
+          <a:effectRef idx="1">
+            <a:schemeClr val="accent2"/>
+          </a:effectRef>
+          <a:fontRef idx="minor">
+            <a:schemeClr val="tx1"/>
+          </a:fontRef>
+        </p:style>
+      </p:cxnSp>
+      <p:cxnSp>
+        <p:nvCxnSpPr>
+          <p:cNvPr id="46" name="Straight Arrow Connector 45"/>
+          <p:cNvCxnSpPr/>
+          <p:nvPr/>
+        </p:nvCxnSpPr>
+        <p:spPr>
+          <a:xfrm>
+            <a:off x="6400800" y="6705600"/>
+            <a:ext cx="76200" cy="728186"/>
+          </a:xfrm>
+          <a:prstGeom prst="straightConnector1">
+            <a:avLst/>
+          </a:prstGeom>
+          <a:ln w="15875">
+            <a:solidFill>
+              <a:srgbClr val="FF0000"/>
+            </a:solidFill>
+            <a:tailEnd type="arrow"/>
+          </a:ln>
+        </p:spPr>
+        <p:style>
+          <a:lnRef idx="2">
+            <a:schemeClr val="accent2"/>
+          </a:lnRef>
+          <a:fillRef idx="0">
+            <a:schemeClr val="accent2"/>
+          </a:fillRef>
+          <a:effectRef idx="1">
+            <a:schemeClr val="accent2"/>
+          </a:effectRef>
+          <a:fontRef idx="minor">
+            <a:schemeClr val="tx1"/>
+          </a:fontRef>
+        </p:style>
+      </p:cxnSp>
+      <p:cxnSp>
+        <p:nvCxnSpPr>
+          <p:cNvPr id="47" name="Straight Arrow Connector 46"/>
+          <p:cNvCxnSpPr/>
+          <p:nvPr/>
+        </p:nvCxnSpPr>
+        <p:spPr>
+          <a:xfrm flipV="1">
+            <a:off x="7620000" y="6705599"/>
+            <a:ext cx="76200" cy="728186"/>
+          </a:xfrm>
+          <a:prstGeom prst="straightConnector1">
+            <a:avLst/>
+          </a:prstGeom>
+          <a:ln w="15875">
+            <a:solidFill>
+              <a:srgbClr val="FF0000"/>
+            </a:solidFill>
+            <a:tailEnd type="arrow"/>
+          </a:ln>
+        </p:spPr>
+        <p:style>
+          <a:lnRef idx="2">
+            <a:schemeClr val="accent2"/>
+          </a:lnRef>
+          <a:fillRef idx="0">
+            <a:schemeClr val="accent2"/>
+          </a:fillRef>
+          <a:effectRef idx="1">
+            <a:schemeClr val="accent2"/>
+          </a:effectRef>
+          <a:fontRef idx="minor">
+            <a:schemeClr val="tx1"/>
+          </a:fontRef>
+        </p:style>
+      </p:cxnSp>
+      <p:sp>
+        <p:nvSpPr>
+          <p:cNvPr id="51" name="TextBox 50"/>
+          <p:cNvSpPr txBox="1"/>
+          <p:nvPr/>
+        </p:nvSpPr>
+        <p:spPr>
+          <a:xfrm>
+            <a:off x="7716103" y="6746527"/>
+            <a:ext cx="1400154" cy="646331"/>
+          </a:xfrm>
+          <a:prstGeom prst="rect">
+            <a:avLst/>
+          </a:prstGeom>
+          <a:noFill/>
+        </p:spPr>
+        <p:txBody>
+          <a:bodyPr wrap="square" rtlCol="0">
+            <a:spAutoFit/>
+          </a:bodyPr>
+          <a:lstStyle/>
+          <a:p>
+            <a:pPr algn="ctr"/>
+            <a:r>
+              <a:rPr lang="en-US" sz="1200" b="1" dirty="0" smtClean="0"/>
+              <a:t>Timeout_Expiry &amp;&amp; Failure_Count &lt; 100</a:t>
+            </a:r>
+            <a:endParaRPr lang="en-US" sz="1200" b="1" dirty="0"/>
+          </a:p>
+        </p:txBody>
+      </p:sp>
+      <p:sp>
+        <p:nvSpPr>
+          <p:cNvPr id="67" name="TextBox 66"/>
+          <p:cNvSpPr txBox="1"/>
+          <p:nvPr/>
+        </p:nvSpPr>
+        <p:spPr>
+          <a:xfrm>
+            <a:off x="11582400" y="12016412"/>
+            <a:ext cx="1128527" cy="307777"/>
+          </a:xfrm>
+          <a:prstGeom prst="rect">
+            <a:avLst/>
+          </a:prstGeom>
+          <a:noFill/>
+        </p:spPr>
+        <p:txBody>
+          <a:bodyPr wrap="square" rtlCol="0">
+            <a:spAutoFit/>
+          </a:bodyPr>
+          <a:lstStyle/>
+          <a:p>
+            <a:r>
+              <a:rPr lang="en-US" sz="1400" b="1" dirty="0" smtClean="0"/>
+              <a:t>    </a:t>
+            </a:r>
+            <a:r>
+              <a:rPr lang="en-US" sz="1400" b="1" dirty="0" smtClean="0"/>
+              <a:t>PowerOFF</a:t>
+            </a:r>
+            <a:endParaRPr lang="en-US" sz="1400" b="1" dirty="0"/>
+          </a:p>
+        </p:txBody>
+      </p:sp>
+      <p:sp>
+        <p:nvSpPr>
+          <p:cNvPr id="74" name="TextBox 73"/>
+          <p:cNvSpPr txBox="1"/>
+          <p:nvPr/>
+        </p:nvSpPr>
+        <p:spPr>
+          <a:xfrm>
+            <a:off x="5076846" y="6746527"/>
+            <a:ext cx="1400154" cy="646331"/>
+          </a:xfrm>
+          <a:prstGeom prst="rect">
+            <a:avLst/>
+          </a:prstGeom>
+          <a:noFill/>
+        </p:spPr>
+        <p:txBody>
+          <a:bodyPr wrap="square" rtlCol="0">
+            <a:spAutoFit/>
+          </a:bodyPr>
+          <a:lstStyle/>
+          <a:p>
+            <a:pPr algn="ctr"/>
+            <a:r>
+              <a:rPr lang="en-US" sz="1200" b="1" dirty="0" smtClean="0"/>
+              <a:t>Timeout_Expiry &amp;&amp; Failure_Count &lt; 100</a:t>
+            </a:r>
+            <a:endParaRPr lang="en-US" sz="1200" b="1" dirty="0"/>
+          </a:p>
+        </p:txBody>
+      </p:sp>
+      <p:sp>
+        <p:nvSpPr>
+          <p:cNvPr id="75" name="Rectangle 74"/>
+          <p:cNvSpPr/>
+          <p:nvPr/>
+        </p:nvSpPr>
+        <p:spPr>
+          <a:xfrm>
+            <a:off x="11582400" y="4454638"/>
+            <a:ext cx="3657600" cy="1903512"/>
+          </a:xfrm>
+          <a:prstGeom prst="rect">
+            <a:avLst/>
+          </a:prstGeom>
+          <a:solidFill>
+            <a:schemeClr val="bg1"/>
+          </a:solidFill>
+          <a:ln w="15875" cmpd="dbl"/>
+        </p:spPr>
+        <p:style>
+          <a:lnRef idx="2">
+            <a:schemeClr val="dk1"/>
+          </a:lnRef>
+          <a:fillRef idx="1">
+            <a:schemeClr val="lt1"/>
+          </a:fillRef>
+          <a:effectRef idx="0">
+            <a:schemeClr val="dk1"/>
+          </a:effectRef>
+          <a:fontRef idx="minor">
+            <a:schemeClr val="dk1"/>
+          </a:fontRef>
+        </p:style>
+        <p:txBody>
+          <a:bodyPr rtlCol="0" anchor="ctr"/>
+          <a:lstStyle/>
+          <a:p>
+            <a:pPr algn="ctr"/>
+            <a:endParaRPr lang="en-US" sz="2400" b="1" u="sng" dirty="0" smtClean="0"/>
+          </a:p>
+          <a:p>
+            <a:pPr algn="ctr"/>
+            <a:r>
+              <a:rPr lang="en-US" sz="2400" b="1" u="sng" dirty="0" smtClean="0"/>
+              <a:t>s</a:t>
+            </a:r>
+            <a:r>
+              <a:rPr lang="en-US" sz="2400" b="1" u="sng" dirty="0" smtClean="0"/>
+              <a:t>tate: Bay_Control_Failure</a:t>
+            </a:r>
+          </a:p>
+          <a:p>
+            <a:pPr algn="ctr"/>
+            <a:r>
+              <a:rPr lang="en-US" sz="1800" dirty="0" smtClean="0"/>
+              <a:t>This is a failure state where either (1) Initializing tests fail or (2) Repeated timeout failures during bay OPEN or CLOSE operations. </a:t>
+            </a:r>
+            <a:endParaRPr lang="en-US" sz="1800" dirty="0"/>
+          </a:p>
+          <a:p>
+            <a:pPr algn="ctr"/>
+            <a:endParaRPr lang="en-US" sz="2400" b="1" u="sng" dirty="0"/>
+          </a:p>
+        </p:txBody>
+      </p:sp>
+      <p:cxnSp>
+        <p:nvCxnSpPr>
+          <p:cNvPr id="79" name="Curved Connector 78"/>
+          <p:cNvCxnSpPr>
+            <a:endCxn id="75" idx="1"/>
+          </p:cNvCxnSpPr>
+          <p:nvPr/>
+        </p:nvCxnSpPr>
+        <p:spPr>
+          <a:xfrm>
+            <a:off x="9116257" y="4938499"/>
+            <a:ext cx="2466143" cy="467895"/>
+          </a:xfrm>
+          <a:prstGeom prst="curvedConnector3">
+            <a:avLst>
+              <a:gd name="adj1" fmla="val 40039"/>
+            </a:avLst>
+          </a:prstGeom>
+          <a:ln w="12700">
+            <a:solidFill>
+              <a:srgbClr val="FF0000"/>
+            </a:solidFill>
+            <a:tailEnd type="arrow"/>
+          </a:ln>
+        </p:spPr>
+        <p:style>
+          <a:lnRef idx="2">
+            <a:schemeClr val="accent2"/>
+          </a:lnRef>
+          <a:fillRef idx="0">
+            <a:schemeClr val="accent2"/>
+          </a:fillRef>
+          <a:effectRef idx="1">
+            <a:schemeClr val="accent2"/>
+          </a:effectRef>
+          <a:fontRef idx="minor">
+            <a:schemeClr val="tx1"/>
+          </a:fontRef>
+        </p:style>
+      </p:cxnSp>
+      <p:sp>
+        <p:nvSpPr>
+          <p:cNvPr id="89" name="TextBox 88"/>
+          <p:cNvSpPr txBox="1"/>
+          <p:nvPr/>
+        </p:nvSpPr>
+        <p:spPr>
+          <a:xfrm>
+            <a:off x="10182246" y="4760063"/>
+            <a:ext cx="1400154" cy="646331"/>
+          </a:xfrm>
+          <a:prstGeom prst="rect">
+            <a:avLst/>
+          </a:prstGeom>
+          <a:noFill/>
+        </p:spPr>
+        <p:txBody>
+          <a:bodyPr wrap="square" rtlCol="0">
+            <a:spAutoFit/>
+          </a:bodyPr>
+          <a:lstStyle/>
+          <a:p>
+            <a:pPr algn="ctr"/>
+            <a:r>
+              <a:rPr lang="en-US" sz="1200" b="1" dirty="0" smtClean="0"/>
+              <a:t>Timeout_Expiry &amp;&amp; Failure_Count &gt;= 100</a:t>
+            </a:r>
+            <a:endParaRPr lang="en-US" sz="1200" b="1" dirty="0"/>
+          </a:p>
+        </p:txBody>
+      </p:sp>
+      <p:cxnSp>
+        <p:nvCxnSpPr>
+          <p:cNvPr id="96" name="Curved Connector 95"/>
+          <p:cNvCxnSpPr/>
+          <p:nvPr/>
+        </p:nvCxnSpPr>
+        <p:spPr>
+          <a:xfrm flipV="1">
+            <a:off x="6610634" y="6019802"/>
+            <a:ext cx="4971766" cy="3581398"/>
+          </a:xfrm>
+          <a:prstGeom prst="curvedConnector3">
+            <a:avLst>
+              <a:gd name="adj1" fmla="val 66745"/>
+            </a:avLst>
+          </a:prstGeom>
+          <a:ln>
+            <a:solidFill>
+              <a:srgbClr val="C00000"/>
+            </a:solidFill>
+            <a:tailEnd type="arrow"/>
+          </a:ln>
+        </p:spPr>
+        <p:style>
+          <a:lnRef idx="1">
+            <a:schemeClr val="accent1"/>
+          </a:lnRef>
+          <a:fillRef idx="0">
+            <a:schemeClr val="accent1"/>
+          </a:fillRef>
+          <a:effectRef idx="0">
+            <a:schemeClr val="accent1"/>
+          </a:effectRef>
+          <a:fontRef idx="minor">
+            <a:schemeClr val="tx1"/>
+          </a:fontRef>
+        </p:style>
+      </p:cxnSp>
+      <p:sp>
+        <p:nvSpPr>
+          <p:cNvPr id="100" name="TextBox 99"/>
+          <p:cNvSpPr txBox="1"/>
+          <p:nvPr/>
+        </p:nvSpPr>
+        <p:spPr>
+          <a:xfrm>
+            <a:off x="6956246" y="8988623"/>
+            <a:ext cx="1600200" cy="307777"/>
+          </a:xfrm>
+          <a:prstGeom prst="rect">
+            <a:avLst/>
+          </a:prstGeom>
+          <a:noFill/>
+        </p:spPr>
+        <p:txBody>
+          <a:bodyPr wrap="square" rtlCol="0">
+            <a:spAutoFit/>
+          </a:bodyPr>
+          <a:lstStyle/>
+          <a:p>
+            <a:r>
+              <a:rPr lang="en-US" sz="1400" b="1" dirty="0" smtClean="0"/>
+              <a:t>    </a:t>
+            </a:r>
+            <a:r>
+              <a:rPr lang="en-US" sz="1400" b="1" dirty="0" smtClean="0"/>
+              <a:t>Init_Tests = false</a:t>
+            </a:r>
+            <a:endParaRPr lang="en-US" sz="1400" b="1" dirty="0"/>
+          </a:p>
+        </p:txBody>
+      </p:sp>
+    </p:spTree>
+    <p:extLst>
+      <p:ext uri="{BB962C8B-B14F-4D97-AF65-F5344CB8AC3E}">
+        <p14:creationId xmlns:p14="http://schemas.microsoft.com/office/powerpoint/2010/main" val="1659457642"/>
+      </p:ext>
+    </p:extLst>
+  </p:cSld>
+  <p:clrMapOvr>
+    <a:masterClrMapping/>
+  </p:clrMapOvr>
 </p:sld>
 </file>
 

</xml_diff>

<commit_message>
started working on power requirements
also fixed small nomenclature error in agse statechart
</commit_message>
<xml_diff>
--- a/design/statechart/agse_design_statechart.pptx
+++ b/design/statechart/agse_design_statechart.pptx
@@ -193,7 +193,7 @@
           <a:p>
             <a:fld id="{65F28216-4810-4052-8F3A-34285B87EA79}" type="datetimeFigureOut">
               <a:rPr lang="en-US" smtClean="0"/>
-              <a:t>11/4/2014</a:t>
+              <a:t>2014-11-04</a:t>
             </a:fld>
             <a:endParaRPr lang="en-US"/>
           </a:p>
@@ -726,7 +726,7 @@
           <a:p>
             <a:fld id="{A0F6182D-4BB0-4176-9A51-07A5F05FFC3D}" type="datetimeFigureOut">
               <a:rPr lang="en-US" smtClean="0"/>
-              <a:t>11/4/2014</a:t>
+              <a:t>2014-11-04</a:t>
             </a:fld>
             <a:endParaRPr lang="en-US"/>
           </a:p>
@@ -896,7 +896,7 @@
           <a:p>
             <a:fld id="{A0F6182D-4BB0-4176-9A51-07A5F05FFC3D}" type="datetimeFigureOut">
               <a:rPr lang="en-US" smtClean="0"/>
-              <a:t>11/4/2014</a:t>
+              <a:t>2014-11-04</a:t>
             </a:fld>
             <a:endParaRPr lang="en-US"/>
           </a:p>
@@ -1076,7 +1076,7 @@
           <a:p>
             <a:fld id="{A0F6182D-4BB0-4176-9A51-07A5F05FFC3D}" type="datetimeFigureOut">
               <a:rPr lang="en-US" smtClean="0"/>
-              <a:t>11/4/2014</a:t>
+              <a:t>2014-11-04</a:t>
             </a:fld>
             <a:endParaRPr lang="en-US"/>
           </a:p>
@@ -1246,7 +1246,7 @@
           <a:p>
             <a:fld id="{A0F6182D-4BB0-4176-9A51-07A5F05FFC3D}" type="datetimeFigureOut">
               <a:rPr lang="en-US" smtClean="0"/>
-              <a:t>11/4/2014</a:t>
+              <a:t>2014-11-04</a:t>
             </a:fld>
             <a:endParaRPr lang="en-US"/>
           </a:p>
@@ -1492,7 +1492,7 @@
           <a:p>
             <a:fld id="{A0F6182D-4BB0-4176-9A51-07A5F05FFC3D}" type="datetimeFigureOut">
               <a:rPr lang="en-US" smtClean="0"/>
-              <a:t>11/4/2014</a:t>
+              <a:t>2014-11-04</a:t>
             </a:fld>
             <a:endParaRPr lang="en-US"/>
           </a:p>
@@ -1780,7 +1780,7 @@
           <a:p>
             <a:fld id="{A0F6182D-4BB0-4176-9A51-07A5F05FFC3D}" type="datetimeFigureOut">
               <a:rPr lang="en-US" smtClean="0"/>
-              <a:t>11/4/2014</a:t>
+              <a:t>2014-11-04</a:t>
             </a:fld>
             <a:endParaRPr lang="en-US"/>
           </a:p>
@@ -2207,7 +2207,7 @@
           <a:p>
             <a:fld id="{A0F6182D-4BB0-4176-9A51-07A5F05FFC3D}" type="datetimeFigureOut">
               <a:rPr lang="en-US" smtClean="0"/>
-              <a:t>11/4/2014</a:t>
+              <a:t>2014-11-04</a:t>
             </a:fld>
             <a:endParaRPr lang="en-US"/>
           </a:p>
@@ -2325,7 +2325,7 @@
           <a:p>
             <a:fld id="{A0F6182D-4BB0-4176-9A51-07A5F05FFC3D}" type="datetimeFigureOut">
               <a:rPr lang="en-US" smtClean="0"/>
-              <a:t>11/4/2014</a:t>
+              <a:t>2014-11-04</a:t>
             </a:fld>
             <a:endParaRPr lang="en-US"/>
           </a:p>
@@ -2420,7 +2420,7 @@
           <a:p>
             <a:fld id="{A0F6182D-4BB0-4176-9A51-07A5F05FFC3D}" type="datetimeFigureOut">
               <a:rPr lang="en-US" smtClean="0"/>
-              <a:t>11/4/2014</a:t>
+              <a:t>2014-11-04</a:t>
             </a:fld>
             <a:endParaRPr lang="en-US"/>
           </a:p>
@@ -2697,7 +2697,7 @@
           <a:p>
             <a:fld id="{A0F6182D-4BB0-4176-9A51-07A5F05FFC3D}" type="datetimeFigureOut">
               <a:rPr lang="en-US" smtClean="0"/>
-              <a:t>11/4/2014</a:t>
+              <a:t>2014-11-04</a:t>
             </a:fld>
             <a:endParaRPr lang="en-US"/>
           </a:p>
@@ -2950,7 +2950,7 @@
           <a:p>
             <a:fld id="{A0F6182D-4BB0-4176-9A51-07A5F05FFC3D}" type="datetimeFigureOut">
               <a:rPr lang="en-US" smtClean="0"/>
-              <a:t>11/4/2014</a:t>
+              <a:t>2014-11-04</a:t>
             </a:fld>
             <a:endParaRPr lang="en-US"/>
           </a:p>
@@ -3163,7 +3163,7 @@
           <a:p>
             <a:fld id="{A0F6182D-4BB0-4176-9A51-07A5F05FFC3D}" type="datetimeFigureOut">
               <a:rPr lang="en-US" smtClean="0"/>
-              <a:t>11/4/2014</a:t>
+              <a:t>2014-11-04</a:t>
             </a:fld>
             <a:endParaRPr lang="en-US"/>
           </a:p>
@@ -5408,8 +5408,13 @@
             <a:pPr algn="ctr"/>
             <a:r>
               <a:rPr lang="en-US" sz="2000" dirty="0" smtClean="0"/>
-              <a:t>The system is in a paused, suspended state. Variables in memory retain consistent state so that the system can readily goto POWER_ON.</a:t>
-            </a:r>
+              <a:t>The system is in a paused, suspended state. Variables in memory retain consistent state so that the system can readily </a:t>
+            </a:r>
+            <a:r>
+              <a:rPr lang="en-US" sz="2000" dirty="0" smtClean="0"/>
+              <a:t>go to ACTIVE.</a:t>
+            </a:r>
+            <a:endParaRPr lang="en-US" sz="2000" dirty="0" smtClean="0"/>
           </a:p>
           <a:p>
             <a:pPr algn="ctr"/>
@@ -6209,13 +6214,8 @@
             <a:pPr algn="ctr"/>
             <a:r>
               <a:rPr lang="en-US" sz="2400" b="1" u="sng" dirty="0" smtClean="0"/>
-              <a:t>state: </a:t>
-            </a:r>
-            <a:r>
-              <a:rPr lang="en-US" sz="2400" b="1" u="sng" dirty="0" smtClean="0"/>
-              <a:t>POWER_OFF</a:t>
-            </a:r>
-            <a:endParaRPr lang="en-US" sz="2400" b="1" u="sng" dirty="0" smtClean="0"/>
+              <a:t>state: POWER_OFF</a:t>
+            </a:r>
           </a:p>
           <a:p>
             <a:pPr algn="ctr"/>
@@ -6299,20 +6299,11 @@
               <a:rPr lang="en-US" sz="2400" b="1" dirty="0" smtClean="0"/>
               <a:t>               </a:t>
             </a:r>
-            <a:endParaRPr lang="en-US" sz="2400" b="1" dirty="0" smtClean="0"/>
           </a:p>
           <a:p>
             <a:r>
               <a:rPr lang="en-US" sz="2400" b="1" u="sng" dirty="0" smtClean="0"/>
-              <a:t>state</a:t>
-            </a:r>
-            <a:r>
-              <a:rPr lang="en-US" sz="2400" b="1" u="sng" dirty="0" smtClean="0"/>
-              <a:t>: </a:t>
-            </a:r>
-            <a:r>
-              <a:rPr lang="en-US" sz="2400" b="1" u="sng" dirty="0" smtClean="0"/>
-              <a:t>POWER_ON</a:t>
+              <a:t>state: POWER_ON</a:t>
             </a:r>
           </a:p>
           <a:p>
@@ -6497,11 +6488,7 @@
             <a:pPr algn="ctr"/>
             <a:r>
               <a:rPr lang="en-US" sz="2000" dirty="0" smtClean="0"/>
-              <a:t>The Payload bay is completely closed. This state is reached when either (1) the sample is retrieved by the AGSE and secured in the bay or (2) t</a:t>
-            </a:r>
-            <a:r>
-              <a:rPr lang="en-US" sz="2000" dirty="0" smtClean="0"/>
-              <a:t>he bay is closed after successful initialization.</a:t>
+              <a:t>The Payload bay is completely closed. This state is reached when either (1) the sample is retrieved by the AGSE and secured in the bay or (2) the bay is closed after successful initialization.</a:t>
             </a:r>
             <a:endParaRPr lang="en-US" sz="2000" dirty="0"/>
           </a:p>
@@ -6872,11 +6859,7 @@
           <a:p>
             <a:r>
               <a:rPr lang="en-US" sz="1400" b="1" dirty="0" smtClean="0"/>
-              <a:t>    </a:t>
-            </a:r>
-            <a:r>
-              <a:rPr lang="en-US" sz="1400" b="1" dirty="0" smtClean="0"/>
-              <a:t>Init_Tests = true</a:t>
+              <a:t>    Init_Tests = true</a:t>
             </a:r>
             <a:endParaRPr lang="en-US" sz="1400" b="1" dirty="0"/>
           </a:p>
@@ -7325,11 +7308,7 @@
           <a:p>
             <a:r>
               <a:rPr lang="en-US" sz="1400" b="1" dirty="0" smtClean="0"/>
-              <a:t>    </a:t>
-            </a:r>
-            <a:r>
-              <a:rPr lang="en-US" sz="1400" b="1" dirty="0" smtClean="0"/>
-              <a:t>PowerOFF</a:t>
+              <a:t>    PowerOFF</a:t>
             </a:r>
             <a:endParaRPr lang="en-US" sz="1400" b="1" dirty="0"/>
           </a:p>
@@ -7410,11 +7389,7 @@
             <a:pPr algn="ctr"/>
             <a:r>
               <a:rPr lang="en-US" sz="2400" b="1" u="sng" dirty="0" smtClean="0"/>
-              <a:t>s</a:t>
-            </a:r>
-            <a:r>
-              <a:rPr lang="en-US" sz="2400" b="1" u="sng" dirty="0" smtClean="0"/>
-              <a:t>tate: Bay_Control_Failure</a:t>
+              <a:t>state: Bay_Control_Failure</a:t>
             </a:r>
           </a:p>
           <a:p>
@@ -7564,11 +7539,7 @@
           <a:p>
             <a:r>
               <a:rPr lang="en-US" sz="1400" b="1" dirty="0" smtClean="0"/>
-              <a:t>    </a:t>
-            </a:r>
-            <a:r>
-              <a:rPr lang="en-US" sz="1400" b="1" dirty="0" smtClean="0"/>
-              <a:t>Init_Tests = false</a:t>
+              <a:t>    Init_Tests = false</a:t>
             </a:r>
             <a:endParaRPr lang="en-US" sz="1400" b="1" dirty="0"/>
           </a:p>

</xml_diff>